<commit_message>
Update e.g. exam topic list, add some images and Dockerfile examples
</commit_message>
<xml_diff>
--- a/01_docker/DockerCaseExample.pptx
+++ b/01_docker/DockerCaseExample.pptx
@@ -540,6 +540,7 @@
     </c:legend>
     <c:plotVisOnly val="1"/>
     <c:dispBlanksAs val="gap"/>
+    <c:showDLblsOverMax val="0"/>
     <c:extLst>
       <c:ext xmlns:c16r3="http://schemas.microsoft.com/office/drawing/2017/03/chart" uri="{56B9EC1D-385E-4148-901F-78D8002777C0}">
         <c16r3:dataDisplayOptions16>
@@ -547,7 +548,6 @@
         </c16r3:dataDisplayOptions16>
       </c:ext>
     </c:extLst>
-    <c:showDLblsOverMax val="0"/>
   </c:chart>
   <c:spPr>
     <a:noFill/>
@@ -1197,7 +1197,7 @@
           <a:p>
             <a:fld id="{5645C365-1C26-6946-87AF-75D6A7DF4277}" type="datetimeFigureOut">
               <a:rPr lang="en-GB" smtClean="0"/>
-              <a:t>29/08/2024</a:t>
+              <a:t>12/02/2026</a:t>
             </a:fld>
             <a:endParaRPr lang="en-GB"/>
           </a:p>
@@ -1696,7 +1696,7 @@
           <a:p>
             <a:fld id="{35B864B8-8D08-7B43-B4FB-B2FB41A5D9E3}" type="datetime1">
               <a:rPr lang="fi-FI" smtClean="0"/>
-              <a:t>29.8.2024</a:t>
+              <a:t>12.2.2026</a:t>
             </a:fld>
             <a:endParaRPr lang="en-GB" dirty="0"/>
           </a:p>
@@ -2023,7 +2023,7 @@
           <a:p>
             <a:fld id="{D5AEA85A-FC56-D34C-9AA6-ECC3D2586F37}" type="datetime1">
               <a:rPr lang="fi-FI" smtClean="0"/>
-              <a:t>29.8.2024</a:t>
+              <a:t>12.2.2026</a:t>
             </a:fld>
             <a:endParaRPr lang="en-GB" dirty="0"/>
           </a:p>
@@ -2233,7 +2233,7 @@
           <a:p>
             <a:fld id="{E6BC6EEF-E660-7844-8930-418AFF95EA40}" type="datetime1">
               <a:rPr lang="fi-FI" smtClean="0"/>
-              <a:t>29.8.2024</a:t>
+              <a:t>12.2.2026</a:t>
             </a:fld>
             <a:endParaRPr lang="en-GB" dirty="0"/>
           </a:p>
@@ -2542,7 +2542,7 @@
           <a:p>
             <a:fld id="{4E10C7EC-C1C1-9849-A573-7692478FCD52}" type="datetime1">
               <a:rPr lang="fi-FI" smtClean="0"/>
-              <a:t>29.8.2024</a:t>
+              <a:t>12.2.2026</a:t>
             </a:fld>
             <a:endParaRPr lang="en-GB" dirty="0"/>
           </a:p>
@@ -2815,7 +2815,7 @@
           <a:p>
             <a:fld id="{844FF3FE-30BE-2040-9151-6FBC4992BF4F}" type="datetime1">
               <a:rPr lang="fi-FI" smtClean="0"/>
-              <a:t>29.8.2024</a:t>
+              <a:t>12.2.2026</a:t>
             </a:fld>
             <a:endParaRPr lang="en-GB" dirty="0"/>
           </a:p>
@@ -3055,7 +3055,7 @@
           <a:p>
             <a:fld id="{11EDCD7B-6966-E249-89F2-D46BDFBF56BE}" type="datetime1">
               <a:rPr lang="fi-FI" smtClean="0"/>
-              <a:t>29.8.2024</a:t>
+              <a:t>12.2.2026</a:t>
             </a:fld>
             <a:endParaRPr lang="en-GB" dirty="0"/>
           </a:p>
@@ -3348,7 +3348,7 @@
           <a:p>
             <a:fld id="{11EDCD7B-6966-E249-89F2-D46BDFBF56BE}" type="datetime1">
               <a:rPr lang="fi-FI" smtClean="0"/>
-              <a:t>29.8.2024</a:t>
+              <a:t>12.2.2026</a:t>
             </a:fld>
             <a:endParaRPr lang="en-GB" dirty="0"/>
           </a:p>
@@ -3787,7 +3787,7 @@
           <a:p>
             <a:fld id="{844FF3FE-30BE-2040-9151-6FBC4992BF4F}" type="datetime1">
               <a:rPr lang="fi-FI" smtClean="0"/>
-              <a:t>29.8.2024</a:t>
+              <a:t>12.2.2026</a:t>
             </a:fld>
             <a:endParaRPr lang="en-GB" dirty="0"/>
           </a:p>
@@ -4015,7 +4015,7 @@
           <a:p>
             <a:fld id="{11EDCD7B-6966-E249-89F2-D46BDFBF56BE}" type="datetime1">
               <a:rPr lang="fi-FI" smtClean="0"/>
-              <a:t>29.8.2024</a:t>
+              <a:t>12.2.2026</a:t>
             </a:fld>
             <a:endParaRPr lang="en-GB" dirty="0"/>
           </a:p>
@@ -4430,7 +4430,7 @@
           <a:p>
             <a:fld id="{B62E192A-D52B-F541-B2AA-4AEB9388F1F7}" type="datetime1">
               <a:rPr lang="fi-FI" smtClean="0"/>
-              <a:t>29.8.2024</a:t>
+              <a:t>12.2.2026</a:t>
             </a:fld>
             <a:endParaRPr lang="en-GB" dirty="0"/>
           </a:p>
@@ -4730,7 +4730,7 @@
           <a:p>
             <a:fld id="{EEA4FAA2-2B3E-264C-A42F-2D6D3EF33A3C}" type="datetime1">
               <a:rPr lang="fi-FI" smtClean="0"/>
-              <a:t>29.8.2024</a:t>
+              <a:t>12.2.2026</a:t>
             </a:fld>
             <a:endParaRPr lang="en-GB" dirty="0"/>
           </a:p>
@@ -5633,7 +5633,7 @@
           <a:p>
             <a:fld id="{B3114A65-8017-1743-A85A-B2A4BB835AE9}" type="datetime1">
               <a:rPr lang="fi-FI" smtClean="0"/>
-              <a:t>29.8.2024</a:t>
+              <a:t>12.2.2026</a:t>
             </a:fld>
             <a:endParaRPr lang="en-GB" dirty="0"/>
           </a:p>
@@ -5861,7 +5861,7 @@
           <a:p>
             <a:fld id="{11EDCD7B-6966-E249-89F2-D46BDFBF56BE}" type="datetime1">
               <a:rPr lang="fi-FI" smtClean="0"/>
-              <a:t>29.8.2024</a:t>
+              <a:t>12.2.2026</a:t>
             </a:fld>
             <a:endParaRPr lang="en-GB" dirty="0"/>
           </a:p>
@@ -6153,7 +6153,7 @@
           <a:p>
             <a:fld id="{45F98643-D206-614D-B596-3C8548138211}" type="datetime1">
               <a:rPr lang="fi-FI" smtClean="0"/>
-              <a:t>29.8.2024</a:t>
+              <a:t>12.2.2026</a:t>
             </a:fld>
             <a:endParaRPr lang="en-GB" dirty="0"/>
           </a:p>
@@ -6817,7 +6817,7 @@
           <a:p>
             <a:fld id="{30BF63A1-919F-FB49-ABA8-182126D24C50}" type="datetime1">
               <a:rPr lang="fi-FI" smtClean="0"/>
-              <a:t>29.8.2024</a:t>
+              <a:t>12.2.2026</a:t>
             </a:fld>
             <a:endParaRPr lang="en-GB" dirty="0"/>
           </a:p>
@@ -7026,7 +7026,7 @@
           <a:p>
             <a:fld id="{202E1EC2-47B8-044B-A09E-6A63B4D80C87}" type="datetime1">
               <a:rPr lang="fi-FI" smtClean="0"/>
-              <a:t>29.8.2024</a:t>
+              <a:t>12.2.2026</a:t>
             </a:fld>
             <a:endParaRPr lang="en-GB"/>
           </a:p>
@@ -7139,7 +7139,7 @@
           <a:p>
             <a:fld id="{202E1EC2-47B8-044B-A09E-6A63B4D80C87}" type="datetime1">
               <a:rPr lang="fi-FI" smtClean="0"/>
-              <a:t>29.8.2024</a:t>
+              <a:t>12.2.2026</a:t>
             </a:fld>
             <a:endParaRPr lang="en-GB"/>
           </a:p>
@@ -7379,10 +7379,10 @@
       </p:sp>
       <p:pic>
         <p:nvPicPr>
-          <p:cNvPr id="3" name="Picture 2" descr="A diagram of a diagram&#10;&#10;Description automatically generated">
-            <a:extLst>
-              <a:ext uri="{FF2B5EF4-FFF2-40B4-BE49-F238E27FC236}">
-                <a16:creationId xmlns:a16="http://schemas.microsoft.com/office/drawing/2014/main" id="{63AB7B03-3C1A-C212-2497-118BFE8D9010}"/>
+          <p:cNvPr id="3" name="Picture 2">
+            <a:extLst>
+              <a:ext uri="{FF2B5EF4-FFF2-40B4-BE49-F238E27FC236}">
+                <a16:creationId xmlns:a16="http://schemas.microsoft.com/office/drawing/2014/main" id="{9A93DDBB-F29B-D182-C93C-BCFB932BAD0B}"/>
               </a:ext>
             </a:extLst>
           </p:cNvPr>
@@ -7399,8 +7399,8 @@
         </p:blipFill>
         <p:spPr>
           <a:xfrm>
-            <a:off x="2716567" y="0"/>
-            <a:ext cx="9342268" cy="6090082"/>
+            <a:off x="3266364" y="45493"/>
+            <a:ext cx="8925636" cy="6027762"/>
           </a:xfrm>
           <a:prstGeom prst="rect">
             <a:avLst/>
@@ -7584,7 +7584,7 @@
           <a:p>
             <a:fld id="{202E1EC2-47B8-044B-A09E-6A63B4D80C87}" type="datetime1">
               <a:rPr lang="fi-FI" smtClean="0"/>
-              <a:t>29.8.2024</a:t>
+              <a:t>12.2.2026</a:t>
             </a:fld>
             <a:endParaRPr lang="en-GB"/>
           </a:p>
@@ -7833,7 +7833,7 @@
           <a:p>
             <a:fld id="{202E1EC2-47B8-044B-A09E-6A63B4D80C87}" type="datetime1">
               <a:rPr lang="fi-FI" smtClean="0"/>
-              <a:t>29.8.2024</a:t>
+              <a:t>12.2.2026</a:t>
             </a:fld>
             <a:endParaRPr lang="en-GB"/>
           </a:p>
@@ -8071,7 +8071,7 @@
           <a:p>
             <a:fld id="{202E1EC2-47B8-044B-A09E-6A63B4D80C87}" type="datetime1">
               <a:rPr lang="fi-FI" smtClean="0"/>
-              <a:t>29.8.2024</a:t>
+              <a:t>12.2.2026</a:t>
             </a:fld>
             <a:endParaRPr lang="en-GB"/>
           </a:p>
@@ -8343,7 +8343,7 @@
           <a:p>
             <a:fld id="{7A2E22EC-FB8F-BE4C-8513-60D11DB7758C}" type="datetime1">
               <a:rPr lang="fi-FI" smtClean="0"/>
-              <a:t>29.8.2024</a:t>
+              <a:t>12.2.2026</a:t>
             </a:fld>
             <a:endParaRPr lang="en-GB"/>
           </a:p>
@@ -8973,15 +8973,6 @@
 </file>
 
 <file path=customXml/item1.xml><?xml version="1.0" encoding="utf-8"?>
-<?mso-contentType ?>
-<FormTemplates xmlns="http://schemas.microsoft.com/sharepoint/v3/contenttype/forms">
-  <Display>DocumentLibraryForm</Display>
-  <Edit>DocumentLibraryForm</Edit>
-  <New>DocumentLibraryForm</New>
-</FormTemplates>
-</file>
-
-<file path=customXml/item2.xml><?xml version="1.0" encoding="utf-8"?>
 <p:properties xmlns:p="http://schemas.microsoft.com/office/2006/metadata/properties" xmlns:xsi="http://www.w3.org/2001/XMLSchema-instance" xmlns:pc="http://schemas.microsoft.com/office/infopath/2007/PartnerControls">
   <documentManagement>
     <PublishingExpirationDate xmlns="http://schemas.microsoft.com/sharepoint/v3" xsi:nil="true"/>
@@ -8990,7 +8981,7 @@
 </p:properties>
 </file>
 
-<file path=customXml/item3.xml><?xml version="1.0" encoding="utf-8"?>
+<file path=customXml/item2.xml><?xml version="1.0" encoding="utf-8"?>
 <ct:contentTypeSchema xmlns:ct="http://schemas.microsoft.com/office/2006/metadata/contentType" xmlns:ma="http://schemas.microsoft.com/office/2006/metadata/properties/metaAttributes" ct:_="" ma:_="" ma:contentTypeName="Document" ma:contentTypeID="0x01010024C55B41993A414DABB8DD07ACBA0814" ma:contentTypeVersion="1" ma:contentTypeDescription="Create a new document." ma:contentTypeScope="" ma:versionID="3ea0c22b5866975a7b271665de4056c5">
   <xsd:schema xmlns:xsd="http://www.w3.org/2001/XMLSchema" xmlns:xs="http://www.w3.org/2001/XMLSchema" xmlns:p="http://schemas.microsoft.com/office/2006/metadata/properties" xmlns:ns1="http://schemas.microsoft.com/sharepoint/v3" targetNamespace="http://schemas.microsoft.com/office/2006/metadata/properties" ma:root="true" ma:fieldsID="ef2aa9ed40e72a78c3822fc753b43e87" ns1:_="">
     <xsd:import namespace="http://schemas.microsoft.com/sharepoint/v3"/>
@@ -9122,15 +9113,16 @@
 </ct:contentTypeSchema>
 </file>
 
-<file path=customXml/itemProps1.xml><?xml version="1.0" encoding="utf-8"?>
-<ds:datastoreItem xmlns:ds="http://schemas.openxmlformats.org/officeDocument/2006/customXml" ds:itemID="{D546C03B-CD3A-4EA0-AAA4-0E00E896454E}">
-  <ds:schemaRefs>
-    <ds:schemaRef ds:uri="http://schemas.microsoft.com/sharepoint/v3/contenttype/forms"/>
-  </ds:schemaRefs>
-</ds:datastoreItem>
+<file path=customXml/item3.xml><?xml version="1.0" encoding="utf-8"?>
+<?mso-contentType ?>
+<FormTemplates xmlns="http://schemas.microsoft.com/sharepoint/v3/contenttype/forms">
+  <Display>DocumentLibraryForm</Display>
+  <Edit>DocumentLibraryForm</Edit>
+  <New>DocumentLibraryForm</New>
+</FormTemplates>
 </file>
 
-<file path=customXml/itemProps2.xml><?xml version="1.0" encoding="utf-8"?>
+<file path=customXml/itemProps1.xml><?xml version="1.0" encoding="utf-8"?>
 <ds:datastoreItem xmlns:ds="http://schemas.openxmlformats.org/officeDocument/2006/customXml" ds:itemID="{DED4E12E-7268-4B03-A47B-0755D62B5E31}">
   <ds:schemaRefs>
     <ds:schemaRef ds:uri="http://schemas.microsoft.com/sharepoint/v3"/>
@@ -9146,7 +9138,7 @@
 </ds:datastoreItem>
 </file>
 
-<file path=customXml/itemProps3.xml><?xml version="1.0" encoding="utf-8"?>
+<file path=customXml/itemProps2.xml><?xml version="1.0" encoding="utf-8"?>
 <ds:datastoreItem xmlns:ds="http://schemas.openxmlformats.org/officeDocument/2006/customXml" ds:itemID="{B9E4DC25-62AA-44A0-8D5C-DB44892588AF}">
   <ds:schemaRefs>
     <ds:schemaRef ds:uri="http://schemas.microsoft.com/office/2006/metadata/contentType"/>
@@ -9162,4 +9154,12 @@
     <ds:schemaRef ds:uri="http://schemas.microsoft.com/internal/obd"/>
   </ds:schemaRefs>
 </ds:datastoreItem>
+</file>
+
+<file path=customXml/itemProps3.xml><?xml version="1.0" encoding="utf-8"?>
+<ds:datastoreItem xmlns:ds="http://schemas.openxmlformats.org/officeDocument/2006/customXml" ds:itemID="{D546C03B-CD3A-4EA0-AAA4-0E00E896454E}">
+  <ds:schemaRefs>
+    <ds:schemaRef ds:uri="http://schemas.microsoft.com/sharepoint/v3/contenttype/forms"/>
+  </ds:schemaRefs>
+</ds:datastoreItem>
 </file>
</xml_diff>